<commit_message>
edit highscore switch score/top
</commit_message>
<xml_diff>
--- a/GUI Design/Android v2.pptx
+++ b/GUI Design/Android v2.pptx
@@ -246,7 +246,7 @@
           <a:lstStyle/>
           <a:p>
             <a:fld id="{DC95120B-9045-2D4C-A7F2-83EBDE9CBFE9}" type="datetimeFigureOut">
-              <a:t>4/1/16</a:t>
+              <a:t>4/6/16</a:t>
             </a:fld>
             <a:endParaRPr lang="en-US"/>
           </a:p>
@@ -412,7 +412,7 @@
           <a:lstStyle/>
           <a:p>
             <a:fld id="{DC95120B-9045-2D4C-A7F2-83EBDE9CBFE9}" type="datetimeFigureOut">
-              <a:t>4/1/16</a:t>
+              <a:t>4/6/16</a:t>
             </a:fld>
             <a:endParaRPr lang="en-US"/>
           </a:p>
@@ -588,7 +588,7 @@
           <a:lstStyle/>
           <a:p>
             <a:fld id="{DC95120B-9045-2D4C-A7F2-83EBDE9CBFE9}" type="datetimeFigureOut">
-              <a:t>4/1/16</a:t>
+              <a:t>4/6/16</a:t>
             </a:fld>
             <a:endParaRPr lang="en-US"/>
           </a:p>
@@ -754,7 +754,7 @@
           <a:lstStyle/>
           <a:p>
             <a:fld id="{DC95120B-9045-2D4C-A7F2-83EBDE9CBFE9}" type="datetimeFigureOut">
-              <a:t>4/1/16</a:t>
+              <a:t>4/6/16</a:t>
             </a:fld>
             <a:endParaRPr lang="en-US"/>
           </a:p>
@@ -997,7 +997,7 @@
           <a:lstStyle/>
           <a:p>
             <a:fld id="{DC95120B-9045-2D4C-A7F2-83EBDE9CBFE9}" type="datetimeFigureOut">
-              <a:t>4/1/16</a:t>
+              <a:t>4/6/16</a:t>
             </a:fld>
             <a:endParaRPr lang="en-US"/>
           </a:p>
@@ -1224,7 +1224,7 @@
           <a:lstStyle/>
           <a:p>
             <a:fld id="{DC95120B-9045-2D4C-A7F2-83EBDE9CBFE9}" type="datetimeFigureOut">
-              <a:t>4/1/16</a:t>
+              <a:t>4/6/16</a:t>
             </a:fld>
             <a:endParaRPr lang="en-US"/>
           </a:p>
@@ -1586,7 +1586,7 @@
           <a:lstStyle/>
           <a:p>
             <a:fld id="{DC95120B-9045-2D4C-A7F2-83EBDE9CBFE9}" type="datetimeFigureOut">
-              <a:t>4/1/16</a:t>
+              <a:t>4/6/16</a:t>
             </a:fld>
             <a:endParaRPr lang="en-US"/>
           </a:p>
@@ -1701,7 +1701,7 @@
           <a:lstStyle/>
           <a:p>
             <a:fld id="{DC95120B-9045-2D4C-A7F2-83EBDE9CBFE9}" type="datetimeFigureOut">
-              <a:t>4/1/16</a:t>
+              <a:t>4/6/16</a:t>
             </a:fld>
             <a:endParaRPr lang="en-US"/>
           </a:p>
@@ -1794,7 +1794,7 @@
           <a:lstStyle/>
           <a:p>
             <a:fld id="{DC95120B-9045-2D4C-A7F2-83EBDE9CBFE9}" type="datetimeFigureOut">
-              <a:t>4/1/16</a:t>
+              <a:t>4/6/16</a:t>
             </a:fld>
             <a:endParaRPr lang="en-US"/>
           </a:p>
@@ -2067,7 +2067,7 @@
           <a:lstStyle/>
           <a:p>
             <a:fld id="{DC95120B-9045-2D4C-A7F2-83EBDE9CBFE9}" type="datetimeFigureOut">
-              <a:t>4/1/16</a:t>
+              <a:t>4/6/16</a:t>
             </a:fld>
             <a:endParaRPr lang="en-US"/>
           </a:p>
@@ -2317,7 +2317,7 @@
           <a:lstStyle/>
           <a:p>
             <a:fld id="{DC95120B-9045-2D4C-A7F2-83EBDE9CBFE9}" type="datetimeFigureOut">
-              <a:t>4/1/16</a:t>
+              <a:t>4/6/16</a:t>
             </a:fld>
             <a:endParaRPr lang="en-US"/>
           </a:p>
@@ -2526,7 +2526,7 @@
           </a:lstStyle>
           <a:p>
             <a:fld id="{DC95120B-9045-2D4C-A7F2-83EBDE9CBFE9}" type="datetimeFigureOut">
-              <a:t>4/1/16</a:t>
+              <a:t>4/6/16</a:t>
             </a:fld>
             <a:endParaRPr lang="en-US"/>
           </a:p>
@@ -4346,8 +4346,8 @@
         </p:nvSpPr>
         <p:spPr>
           <a:xfrm>
-            <a:off x="1531354" y="2554923"/>
-            <a:ext cx="2113527" cy="264790"/>
+            <a:off x="1537885" y="2773993"/>
+            <a:ext cx="1073336" cy="18000"/>
           </a:xfrm>
           <a:prstGeom prst="rect">
             <a:avLst/>
@@ -5634,6 +5634,78 @@
           </p:txBody>
         </p:sp>
       </p:grpSp>
+      <p:sp>
+        <p:nvSpPr>
+          <p:cNvPr id="3" name="TextBox 2"/>
+          <p:cNvSpPr txBox="1"/>
+          <p:nvPr/>
+        </p:nvSpPr>
+        <p:spPr>
+          <a:xfrm>
+            <a:off x="1537885" y="2539700"/>
+            <a:ext cx="1073336" cy="246221"/>
+          </a:xfrm>
+          <a:prstGeom prst="rect">
+            <a:avLst/>
+          </a:prstGeom>
+          <a:noFill/>
+        </p:spPr>
+        <p:txBody>
+          <a:bodyPr wrap="square" rtlCol="0">
+            <a:spAutoFit/>
+          </a:bodyPr>
+          <a:lstStyle/>
+          <a:p>
+            <a:pPr algn="ctr"/>
+            <a:r>
+              <a:rPr lang="en-US" sz="1000">
+                <a:solidFill>
+                  <a:schemeClr val="accent1">
+                    <a:lumMod val="50000"/>
+                  </a:schemeClr>
+                </a:solidFill>
+              </a:rPr>
+              <a:t>Score</a:t>
+            </a:r>
+          </a:p>
+        </p:txBody>
+      </p:sp>
+      <p:sp>
+        <p:nvSpPr>
+          <p:cNvPr id="37" name="TextBox 36"/>
+          <p:cNvSpPr txBox="1"/>
+          <p:nvPr/>
+        </p:nvSpPr>
+        <p:spPr>
+          <a:xfrm>
+            <a:off x="2583192" y="2546142"/>
+            <a:ext cx="1073336" cy="246221"/>
+          </a:xfrm>
+          <a:prstGeom prst="rect">
+            <a:avLst/>
+          </a:prstGeom>
+          <a:noFill/>
+        </p:spPr>
+        <p:txBody>
+          <a:bodyPr wrap="square" rtlCol="0">
+            <a:spAutoFit/>
+          </a:bodyPr>
+          <a:lstStyle/>
+          <a:p>
+            <a:pPr algn="ctr"/>
+            <a:r>
+              <a:rPr lang="en-US" sz="1000">
+                <a:solidFill>
+                  <a:schemeClr val="accent1">
+                    <a:lumMod val="50000"/>
+                  </a:schemeClr>
+                </a:solidFill>
+              </a:rPr>
+              <a:t>Top</a:t>
+            </a:r>
+          </a:p>
+        </p:txBody>
+      </p:sp>
     </p:spTree>
     <p:extLst>
       <p:ext uri="{BB962C8B-B14F-4D97-AF65-F5344CB8AC3E}">

</xml_diff>